<commit_message>
Ubacena finalna specifikacija i python skripta
</commit_message>
<xml_diff>
--- a/SOFT-finalna specifikacija.pptx
+++ b/SOFT-finalna specifikacija.pptx
@@ -8,12 +8,14 @@
     <p:sldId id="256" r:id="rId2"/>
     <p:sldId id="257" r:id="rId3"/>
     <p:sldId id="258" r:id="rId4"/>
-    <p:sldId id="259" r:id="rId5"/>
-    <p:sldId id="263" r:id="rId6"/>
-    <p:sldId id="260" r:id="rId7"/>
-    <p:sldId id="264" r:id="rId8"/>
-    <p:sldId id="261" r:id="rId9"/>
-    <p:sldId id="265" r:id="rId10"/>
+    <p:sldId id="268" r:id="rId5"/>
+    <p:sldId id="259" r:id="rId6"/>
+    <p:sldId id="263" r:id="rId7"/>
+    <p:sldId id="266" r:id="rId8"/>
+    <p:sldId id="267" r:id="rId9"/>
+    <p:sldId id="264" r:id="rId10"/>
+    <p:sldId id="261" r:id="rId11"/>
+    <p:sldId id="265" r:id="rId12"/>
   </p:sldIdLst>
   <p:sldSz cx="9144000" cy="6858000" type="screen4x3"/>
   <p:notesSz cx="6858000" cy="9144000"/>
@@ -422,7 +424,7 @@
             <a:fld id="{1D8BD707-D9CF-40AE-B4C6-C98DA3205C09}" type="datetimeFigureOut">
               <a:rPr lang="en-US" smtClean="0"/>
               <a:pPr/>
-              <a:t>2/4/2016</a:t>
+              <a:t>2/6/2016</a:t>
             </a:fld>
             <a:endParaRPr lang="en-US"/>
           </a:p>
@@ -609,7 +611,7 @@
             <a:fld id="{1D8BD707-D9CF-40AE-B4C6-C98DA3205C09}" type="datetimeFigureOut">
               <a:rPr lang="en-US" smtClean="0"/>
               <a:pPr/>
-              <a:t>2/4/2016</a:t>
+              <a:t>2/6/2016</a:t>
             </a:fld>
             <a:endParaRPr lang="en-US"/>
           </a:p>
@@ -796,7 +798,7 @@
             <a:fld id="{1D8BD707-D9CF-40AE-B4C6-C98DA3205C09}" type="datetimeFigureOut">
               <a:rPr lang="en-US" smtClean="0"/>
               <a:pPr/>
-              <a:t>2/4/2016</a:t>
+              <a:t>2/6/2016</a:t>
             </a:fld>
             <a:endParaRPr lang="en-US"/>
           </a:p>
@@ -983,7 +985,7 @@
             <a:fld id="{1D8BD707-D9CF-40AE-B4C6-C98DA3205C09}" type="datetimeFigureOut">
               <a:rPr lang="en-US" smtClean="0"/>
               <a:pPr/>
-              <a:t>2/4/2016</a:t>
+              <a:t>2/6/2016</a:t>
             </a:fld>
             <a:endParaRPr lang="en-US"/>
           </a:p>
@@ -1366,7 +1368,7 @@
             <a:fld id="{1D8BD707-D9CF-40AE-B4C6-C98DA3205C09}" type="datetimeFigureOut">
               <a:rPr lang="en-US" smtClean="0"/>
               <a:pPr/>
-              <a:t>2/4/2016</a:t>
+              <a:t>2/6/2016</a:t>
             </a:fld>
             <a:endParaRPr lang="en-US"/>
           </a:p>
@@ -1637,7 +1639,7 @@
             <a:fld id="{1D8BD707-D9CF-40AE-B4C6-C98DA3205C09}" type="datetimeFigureOut">
               <a:rPr lang="en-US" smtClean="0"/>
               <a:pPr/>
-              <a:t>2/4/2016</a:t>
+              <a:t>2/6/2016</a:t>
             </a:fld>
             <a:endParaRPr lang="en-US"/>
           </a:p>
@@ -2024,7 +2026,7 @@
             <a:fld id="{1D8BD707-D9CF-40AE-B4C6-C98DA3205C09}" type="datetimeFigureOut">
               <a:rPr lang="en-US" smtClean="0"/>
               <a:pPr/>
-              <a:t>2/4/2016</a:t>
+              <a:t>2/6/2016</a:t>
             </a:fld>
             <a:endParaRPr lang="en-US"/>
           </a:p>
@@ -2147,7 +2149,7 @@
             <a:fld id="{1D8BD707-D9CF-40AE-B4C6-C98DA3205C09}" type="datetimeFigureOut">
               <a:rPr lang="en-US" smtClean="0"/>
               <a:pPr/>
-              <a:t>2/4/2016</a:t>
+              <a:t>2/6/2016</a:t>
             </a:fld>
             <a:endParaRPr lang="en-US"/>
           </a:p>
@@ -2329,7 +2331,7 @@
             <a:fld id="{1D8BD707-D9CF-40AE-B4C6-C98DA3205C09}" type="datetimeFigureOut">
               <a:rPr lang="en-US" smtClean="0"/>
               <a:pPr/>
-              <a:t>2/4/2016</a:t>
+              <a:t>2/6/2016</a:t>
             </a:fld>
             <a:endParaRPr lang="en-US"/>
           </a:p>
@@ -2665,7 +2667,7 @@
             <a:fld id="{1D8BD707-D9CF-40AE-B4C6-C98DA3205C09}" type="datetimeFigureOut">
               <a:rPr lang="en-US" smtClean="0"/>
               <a:pPr/>
-              <a:t>2/4/2016</a:t>
+              <a:t>2/6/2016</a:t>
             </a:fld>
             <a:endParaRPr lang="en-US"/>
           </a:p>
@@ -3036,7 +3038,7 @@
             <a:fld id="{1D8BD707-D9CF-40AE-B4C6-C98DA3205C09}" type="datetimeFigureOut">
               <a:rPr lang="en-US" smtClean="0"/>
               <a:pPr/>
-              <a:t>2/4/2016</a:t>
+              <a:t>2/6/2016</a:t>
             </a:fld>
             <a:endParaRPr lang="en-US"/>
           </a:p>
@@ -3456,7 +3458,7 @@
             <a:fld id="{1D8BD707-D9CF-40AE-B4C6-C98DA3205C09}" type="datetimeFigureOut">
               <a:rPr lang="en-US" smtClean="0"/>
               <a:pPr/>
-              <a:t>2/4/2016</a:t>
+              <a:t>2/6/2016</a:t>
             </a:fld>
             <a:endParaRPr lang="en-US"/>
           </a:p>
@@ -4062,6 +4064,286 @@
 </p:sld>
 </file>
 
+<file path=ppt/slides/slide10.xml><?xml version="1.0" encoding="utf-8"?>
+<p:sld xmlns:a="http://schemas.openxmlformats.org/drawingml/2006/main" xmlns:r="http://schemas.openxmlformats.org/officeDocument/2006/relationships" xmlns:p="http://schemas.openxmlformats.org/presentationml/2006/main">
+  <p:cSld>
+    <p:spTree>
+      <p:nvGrpSpPr>
+        <p:cNvPr id="1" name=""/>
+        <p:cNvGrpSpPr/>
+        <p:nvPr/>
+      </p:nvGrpSpPr>
+      <p:grpSpPr>
+        <a:xfrm>
+          <a:off x="0" y="0"/>
+          <a:ext cx="0" cy="0"/>
+          <a:chOff x="0" y="0"/>
+          <a:chExt cx="0" cy="0"/>
+        </a:xfrm>
+      </p:grpSpPr>
+      <p:sp>
+        <p:nvSpPr>
+          <p:cNvPr id="2" name="Title 1"/>
+          <p:cNvSpPr>
+            <a:spLocks noGrp="1"/>
+          </p:cNvSpPr>
+          <p:nvPr>
+            <p:ph type="title"/>
+          </p:nvPr>
+        </p:nvSpPr>
+        <p:spPr>
+          <a:xfrm>
+            <a:off x="381000" y="457200"/>
+            <a:ext cx="8183880" cy="1051560"/>
+          </a:xfrm>
+        </p:spPr>
+        <p:txBody>
+          <a:bodyPr/>
+          <a:lstStyle/>
+          <a:p>
+            <a:r>
+              <a:rPr lang="en-US" dirty="0" err="1"/>
+              <a:t>Crtanje</a:t>
+            </a:r>
+            <a:r>
+              <a:rPr lang="en-US" dirty="0"/>
+              <a:t> ER </a:t>
+            </a:r>
+            <a:r>
+              <a:rPr lang="en-US" dirty="0" err="1"/>
+              <a:t>dijagrama</a:t>
+            </a:r>
+            <a:endParaRPr lang="en-US" dirty="0"/>
+          </a:p>
+        </p:txBody>
+      </p:sp>
+      <p:sp>
+        <p:nvSpPr>
+          <p:cNvPr id="3" name="Content Placeholder 2"/>
+          <p:cNvSpPr>
+            <a:spLocks noGrp="1"/>
+          </p:cNvSpPr>
+          <p:nvPr>
+            <p:ph idx="1"/>
+          </p:nvPr>
+        </p:nvSpPr>
+        <p:spPr>
+          <a:xfrm>
+            <a:off x="457200" y="1905000"/>
+            <a:ext cx="8183880" cy="4187952"/>
+          </a:xfrm>
+        </p:spPr>
+        <p:txBody>
+          <a:bodyPr/>
+          <a:lstStyle/>
+          <a:p>
+            <a:r>
+              <a:rPr lang="sr-Latn-RS" dirty="0" smtClean="0"/>
+              <a:t>Na već </a:t>
+            </a:r>
+            <a:r>
+              <a:rPr lang="en-US" dirty="0" err="1" smtClean="0"/>
+              <a:t>gotovom</a:t>
+            </a:r>
+            <a:r>
+              <a:rPr lang="en-US" dirty="0" smtClean="0"/>
+              <a:t> </a:t>
+            </a:r>
+            <a:r>
+              <a:rPr lang="en-US" dirty="0" err="1" smtClean="0"/>
+              <a:t>prikazu</a:t>
+            </a:r>
+            <a:r>
+              <a:rPr lang="en-US" dirty="0" smtClean="0"/>
+              <a:t> </a:t>
+            </a:r>
+            <a:r>
+              <a:rPr lang="sr-Latn-RS" dirty="0" smtClean="0"/>
+              <a:t>moguće je klikom na vezu dobiti </a:t>
+            </a:r>
+            <a:r>
+              <a:rPr lang="sr-Latn-RS" i="1" dirty="0" smtClean="0"/>
+              <a:t>message box </a:t>
+            </a:r>
+            <a:r>
+              <a:rPr lang="sr-Latn-RS" dirty="0" smtClean="0"/>
+              <a:t>sa ispisanim kardinalitetima i entitetima koji ucestvuju u vezi ili jednostavnim prislanjanjem kursora miša na vezu takodje je moguće videti kardinalitete kao </a:t>
+            </a:r>
+            <a:r>
+              <a:rPr lang="sr-Latn-RS" i="1" dirty="0" smtClean="0"/>
+              <a:t>tooltip</a:t>
+            </a:r>
+            <a:r>
+              <a:rPr lang="sr-Latn-RS" dirty="0" smtClean="0"/>
+              <a:t>. Pored toga, omogućen je </a:t>
+            </a:r>
+            <a:r>
+              <a:rPr lang="sr-Latn-RS" i="1" dirty="0" smtClean="0"/>
+              <a:t>drag&amp;drop</a:t>
+            </a:r>
+            <a:r>
+              <a:rPr lang="sr-Latn-RS" dirty="0" smtClean="0"/>
+              <a:t> </a:t>
+            </a:r>
+            <a:r>
+              <a:rPr lang="en-US" dirty="0" err="1" smtClean="0"/>
+              <a:t>nad</a:t>
+            </a:r>
+            <a:r>
+              <a:rPr lang="en-US" dirty="0" smtClean="0"/>
+              <a:t> </a:t>
+            </a:r>
+            <a:r>
+              <a:rPr lang="sr-Latn-RS" dirty="0" smtClean="0"/>
+              <a:t>entitet</a:t>
+            </a:r>
+            <a:r>
+              <a:rPr lang="en-US" dirty="0" err="1" smtClean="0"/>
+              <a:t>ima</a:t>
+            </a:r>
+            <a:r>
+              <a:rPr lang="en-US" dirty="0" smtClean="0"/>
+              <a:t> </a:t>
+            </a:r>
+            <a:r>
+              <a:rPr lang="sr-Latn-RS" dirty="0" smtClean="0"/>
+              <a:t>i nj</a:t>
+            </a:r>
+            <a:r>
+              <a:rPr lang="en-US" dirty="0" err="1" smtClean="0"/>
+              <a:t>ihovim</a:t>
+            </a:r>
+            <a:r>
+              <a:rPr lang="sr-Latn-RS" dirty="0" smtClean="0"/>
+              <a:t> vez</a:t>
+            </a:r>
+            <a:r>
+              <a:rPr lang="en-US" dirty="0" err="1" smtClean="0"/>
+              <a:t>ama</a:t>
+            </a:r>
+            <a:r>
+              <a:rPr lang="sr-Latn-RS" dirty="0" smtClean="0"/>
+              <a:t> kao i </a:t>
+            </a:r>
+            <a:r>
+              <a:rPr lang="sr-Latn-RS" i="1" dirty="0" smtClean="0"/>
+              <a:t>zoom </a:t>
+            </a:r>
+            <a:r>
+              <a:rPr lang="sr-Latn-RS" dirty="0" smtClean="0"/>
+              <a:t>samog prikaza.</a:t>
+            </a:r>
+            <a:endParaRPr lang="en-US" dirty="0"/>
+          </a:p>
+        </p:txBody>
+      </p:sp>
+    </p:spTree>
+    <p:extLst>
+      <p:ext uri="{BB962C8B-B14F-4D97-AF65-F5344CB8AC3E}">
+        <p14:creationId xmlns:p14="http://schemas.microsoft.com/office/powerpoint/2010/main" val="1534458821"/>
+      </p:ext>
+    </p:extLst>
+  </p:cSld>
+  <p:clrMapOvr>
+    <a:masterClrMapping/>
+  </p:clrMapOvr>
+  <p:timing>
+    <p:tnLst>
+      <p:par>
+        <p:cTn id="1" dur="indefinite" restart="never" nodeType="tmRoot"/>
+      </p:par>
+    </p:tnLst>
+  </p:timing>
+</p:sld>
+</file>
+
+<file path=ppt/slides/slide11.xml><?xml version="1.0" encoding="utf-8"?>
+<p:sld xmlns:a="http://schemas.openxmlformats.org/drawingml/2006/main" xmlns:r="http://schemas.openxmlformats.org/officeDocument/2006/relationships" xmlns:p="http://schemas.openxmlformats.org/presentationml/2006/main">
+  <p:cSld>
+    <p:spTree>
+      <p:nvGrpSpPr>
+        <p:cNvPr id="1" name=""/>
+        <p:cNvGrpSpPr/>
+        <p:nvPr/>
+      </p:nvGrpSpPr>
+      <p:grpSpPr>
+        <a:xfrm>
+          <a:off x="0" y="0"/>
+          <a:ext cx="0" cy="0"/>
+          <a:chOff x="0" y="0"/>
+          <a:chExt cx="0" cy="0"/>
+        </a:xfrm>
+      </p:grpSpPr>
+      <p:sp>
+        <p:nvSpPr>
+          <p:cNvPr id="2" name="Title 1"/>
+          <p:cNvSpPr>
+            <a:spLocks noGrp="1"/>
+          </p:cNvSpPr>
+          <p:nvPr>
+            <p:ph type="title"/>
+          </p:nvPr>
+        </p:nvSpPr>
+        <p:spPr>
+          <a:xfrm>
+            <a:off x="457200" y="457200"/>
+            <a:ext cx="8183880" cy="1051560"/>
+          </a:xfrm>
+        </p:spPr>
+        <p:txBody>
+          <a:bodyPr/>
+          <a:lstStyle/>
+          <a:p>
+            <a:r>
+              <a:rPr lang="sr-Latn-RS" dirty="0" smtClean="0"/>
+              <a:t>  Pitanja</a:t>
+            </a:r>
+            <a:endParaRPr lang="sr-Latn-RS" dirty="0"/>
+          </a:p>
+        </p:txBody>
+      </p:sp>
+      <p:pic>
+        <p:nvPicPr>
+          <p:cNvPr id="4" name="Content Placeholder 3"/>
+          <p:cNvPicPr>
+            <a:picLocks noGrp="1" noChangeAspect="1"/>
+          </p:cNvPicPr>
+          <p:nvPr>
+            <p:ph idx="1"/>
+          </p:nvPr>
+        </p:nvPicPr>
+        <p:blipFill>
+          <a:blip r:embed="rId2">
+            <a:extLst>
+              <a:ext uri="{28A0092B-C50C-407E-A947-70E740481C1C}">
+                <a14:useLocalDpi xmlns:a14="http://schemas.microsoft.com/office/drawing/2010/main" val="0"/>
+              </a:ext>
+            </a:extLst>
+          </a:blip>
+          <a:stretch>
+            <a:fillRect/>
+          </a:stretch>
+        </p:blipFill>
+        <p:spPr>
+          <a:xfrm>
+            <a:off x="3276600" y="1371600"/>
+            <a:ext cx="3886200" cy="4352014"/>
+          </a:xfrm>
+        </p:spPr>
+      </p:pic>
+    </p:spTree>
+    <p:extLst>
+      <p:ext uri="{BB962C8B-B14F-4D97-AF65-F5344CB8AC3E}">
+        <p14:creationId xmlns:p14="http://schemas.microsoft.com/office/powerpoint/2010/main" val="814834629"/>
+      </p:ext>
+    </p:extLst>
+  </p:cSld>
+  <p:clrMapOvr>
+    <a:masterClrMapping/>
+  </p:clrMapOvr>
+</p:sld>
+</file>
+
 <file path=ppt/slides/slide2.xml><?xml version="1.0" encoding="utf-8"?>
 <p:sld xmlns:a="http://schemas.openxmlformats.org/drawingml/2006/main" xmlns:r="http://schemas.openxmlformats.org/officeDocument/2006/relationships" xmlns:p="http://schemas.openxmlformats.org/presentationml/2006/main">
   <p:cSld>
@@ -4288,26 +4570,16 @@
           <a:p>
             <a:r>
               <a:rPr lang="sr-Latn-RS" dirty="0" smtClean="0"/>
-              <a:t>Koraci za izradu projekta mogu se dekomponovati na 3 osnovna koraka koja obuhvataju:</a:t>
-            </a:r>
-          </a:p>
-          <a:p>
-            <a:pPr lvl="1"/>
+              <a:t>Koraci za izradu projekta mogu se dekomponovati na 4 osnovna koraka koja obuhvataju:</a:t>
+            </a:r>
+          </a:p>
+          <a:p>
+            <a:pPr marL="347472" lvl="1" indent="0">
+              <a:buNone/>
+            </a:pPr>
             <a:r>
               <a:rPr lang="sr-Latn-RS" dirty="0" smtClean="0"/>
-              <a:t> Obučavanje neuronske mreže tako da prepoznaje velika i mala slova, brojeve kao i neke specijalne karaktere( </a:t>
-            </a:r>
-            <a:r>
-              <a:rPr lang="en-US" dirty="0" smtClean="0"/>
-              <a:t>‘.’ , ‘,’ , ‘*’ ..). </a:t>
-            </a:r>
-            <a:r>
-              <a:rPr lang="en-US" dirty="0" err="1" smtClean="0"/>
-              <a:t>Obu</a:t>
-            </a:r>
-            <a:r>
-              <a:rPr lang="sr-Latn-RS" dirty="0" smtClean="0"/>
-              <a:t>čenu neuronsku mrežu koristimo u koraku 2 ( prepoznavanje specifikacije ER modela).	</a:t>
+              <a:t>	</a:t>
             </a:r>
             <a:r>
               <a:rPr lang="sr-Latn-RS" dirty="0"/>
@@ -4360,7 +4632,7 @@
       </p:grpSpPr>
       <p:sp>
         <p:nvSpPr>
-          <p:cNvPr id="2" name="Title 1"/>
+          <p:cNvPr id="4" name="Title 1"/>
           <p:cNvSpPr>
             <a:spLocks noGrp="1"/>
           </p:cNvSpPr>
@@ -4370,7 +4642,7 @@
         </p:nvSpPr>
         <p:spPr>
           <a:xfrm>
-            <a:off x="457200" y="457200"/>
+            <a:off x="457200" y="381000"/>
             <a:ext cx="8183880" cy="1051560"/>
           </a:xfrm>
         </p:spPr>
@@ -4394,253 +4666,59 @@
           </a:p>
         </p:txBody>
       </p:sp>
-      <p:sp>
-        <p:nvSpPr>
-          <p:cNvPr id="3" name="Content Placeholder 2"/>
-          <p:cNvSpPr>
-            <a:spLocks noGrp="1"/>
-          </p:cNvSpPr>
+      <p:pic>
+        <p:nvPicPr>
+          <p:cNvPr id="5" name="Content Placeholder 4" descr="C:\Users\Bojan\Desktop\1.png"/>
+          <p:cNvPicPr>
+            <a:picLocks noGrp="1" noChangeAspect="1" noChangeArrowheads="1"/>
+          </p:cNvPicPr>
           <p:nvPr>
             <p:ph idx="1"/>
           </p:nvPr>
-        </p:nvSpPr>
-        <p:spPr>
-          <a:xfrm>
-            <a:off x="381000" y="1828800"/>
-            <a:ext cx="8183880" cy="4187952"/>
-          </a:xfrm>
-        </p:spPr>
-        <p:txBody>
-          <a:bodyPr/>
-          <a:lstStyle/>
-          <a:p>
-            <a:pPr lvl="1"/>
-            <a:r>
-              <a:rPr lang="en-US" dirty="0" smtClean="0"/>
-              <a:t>Na </a:t>
-            </a:r>
-            <a:r>
-              <a:rPr lang="en-US" dirty="0" err="1" smtClean="0"/>
-              <a:t>osnovu</a:t>
-            </a:r>
-            <a:r>
-              <a:rPr lang="en-US" dirty="0" smtClean="0"/>
-              <a:t> </a:t>
-            </a:r>
-            <a:r>
-              <a:rPr lang="en-US" dirty="0" err="1" smtClean="0"/>
-              <a:t>obu</a:t>
-            </a:r>
-            <a:r>
-              <a:rPr lang="sr-Latn-RS" dirty="0" smtClean="0"/>
-              <a:t>čene neuornske mreže</a:t>
-            </a:r>
-            <a:r>
-              <a:rPr lang="en-US" dirty="0" smtClean="0"/>
-              <a:t> </a:t>
-            </a:r>
-            <a:r>
-              <a:rPr lang="en-US" dirty="0" err="1" smtClean="0"/>
-              <a:t>potrebno</a:t>
-            </a:r>
-            <a:r>
-              <a:rPr lang="en-US" dirty="0" smtClean="0"/>
-              <a:t> je </a:t>
-            </a:r>
-            <a:r>
-              <a:rPr lang="en-US" dirty="0" err="1" smtClean="0"/>
-              <a:t>prepoznati</a:t>
-            </a:r>
-            <a:r>
-              <a:rPr lang="en-US" dirty="0" smtClean="0"/>
-              <a:t> </a:t>
-            </a:r>
-            <a:r>
-              <a:rPr lang="en-US" dirty="0" err="1" smtClean="0"/>
-              <a:t>specifikaciju</a:t>
-            </a:r>
-            <a:r>
-              <a:rPr lang="en-US" dirty="0" smtClean="0"/>
-              <a:t> </a:t>
-            </a:r>
-            <a:r>
-              <a:rPr lang="en-US" dirty="0" err="1" smtClean="0"/>
-              <a:t>napisanu</a:t>
-            </a:r>
-            <a:r>
-              <a:rPr lang="en-US" dirty="0" smtClean="0"/>
-              <a:t> u </a:t>
-            </a:r>
-            <a:r>
-              <a:rPr lang="en-US" dirty="0" err="1" smtClean="0"/>
-              <a:t>nekom</a:t>
-            </a:r>
-            <a:r>
-              <a:rPr lang="en-US" dirty="0" smtClean="0"/>
-              <a:t> </a:t>
-            </a:r>
-            <a:r>
-              <a:rPr lang="en-US" dirty="0" err="1" smtClean="0"/>
-              <a:t>netekstualnom</a:t>
-            </a:r>
-            <a:r>
-              <a:rPr lang="en-US" dirty="0" smtClean="0"/>
-              <a:t> </a:t>
-            </a:r>
-            <a:r>
-              <a:rPr lang="en-US" dirty="0" err="1" smtClean="0"/>
-              <a:t>editoru</a:t>
-            </a:r>
-            <a:r>
-              <a:rPr lang="sr-Latn-RS" dirty="0" smtClean="0"/>
-              <a:t> na engleskom jeziku</a:t>
-            </a:r>
-            <a:r>
-              <a:rPr lang="en-US" dirty="0" smtClean="0"/>
-              <a:t> </a:t>
-            </a:r>
-            <a:r>
-              <a:rPr lang="en-US" dirty="0" err="1" smtClean="0"/>
-              <a:t>izvlacenjem</a:t>
-            </a:r>
-            <a:r>
-              <a:rPr lang="en-US" dirty="0" smtClean="0"/>
-              <a:t> </a:t>
-            </a:r>
-            <a:r>
-              <a:rPr lang="en-US" dirty="0" err="1" smtClean="0"/>
-              <a:t>iz</a:t>
-            </a:r>
-            <a:r>
-              <a:rPr lang="en-US" dirty="0" smtClean="0"/>
-              <a:t> </a:t>
-            </a:r>
-            <a:r>
-              <a:rPr lang="en-US" dirty="0" err="1" smtClean="0"/>
-              <a:t>teksta</a:t>
-            </a:r>
-            <a:r>
-              <a:rPr lang="en-US" dirty="0" smtClean="0"/>
-              <a:t> </a:t>
-            </a:r>
-            <a:r>
-              <a:rPr lang="en-US" dirty="0" err="1" smtClean="0"/>
-              <a:t>sta</a:t>
-            </a:r>
-            <a:r>
-              <a:rPr lang="en-US" dirty="0" smtClean="0"/>
-              <a:t> </a:t>
-            </a:r>
-            <a:r>
-              <a:rPr lang="en-US" dirty="0" err="1" smtClean="0"/>
-              <a:t>su</a:t>
-            </a:r>
-            <a:r>
-              <a:rPr lang="en-US" dirty="0" smtClean="0"/>
-              <a:t> </a:t>
-            </a:r>
-            <a:r>
-              <a:rPr lang="en-US" dirty="0" err="1" smtClean="0"/>
-              <a:t>entiteti</a:t>
-            </a:r>
-            <a:r>
-              <a:rPr lang="en-US" dirty="0" smtClean="0"/>
-              <a:t>, </a:t>
-            </a:r>
-            <a:r>
-              <a:rPr lang="en-US" dirty="0" err="1" smtClean="0"/>
-              <a:t>katdinalitete</a:t>
-            </a:r>
-            <a:r>
-              <a:rPr lang="en-US" dirty="0" smtClean="0"/>
-              <a:t> i </a:t>
-            </a:r>
-            <a:r>
-              <a:rPr lang="en-US" dirty="0" err="1" smtClean="0"/>
-              <a:t>poveznike</a:t>
-            </a:r>
-            <a:r>
-              <a:rPr lang="en-US" dirty="0" smtClean="0"/>
-              <a:t>.</a:t>
-            </a:r>
-            <a:endParaRPr lang="sr-Latn-RS" dirty="0" smtClean="0"/>
-          </a:p>
-          <a:p>
-            <a:pPr lvl="2"/>
-            <a:r>
-              <a:rPr lang="sr-Latn-RS" dirty="0" smtClean="0"/>
-              <a:t>Kardinaliteti se navode pomoću brojeva ’0’ , ’1’ i  karaktera ’*’</a:t>
-            </a:r>
-            <a:r>
-              <a:rPr lang="en-US" dirty="0" smtClean="0"/>
-              <a:t> </a:t>
-            </a:r>
-            <a:r>
-              <a:rPr lang="en-US" dirty="0" err="1" smtClean="0"/>
-              <a:t>koja</a:t>
-            </a:r>
-            <a:r>
-              <a:rPr lang="en-US" dirty="0" smtClean="0"/>
-              <a:t> </a:t>
-            </a:r>
-            <a:r>
-              <a:rPr lang="en-US" dirty="0" err="1" smtClean="0"/>
-              <a:t>predstavlja</a:t>
-            </a:r>
-            <a:r>
-              <a:rPr lang="en-US" dirty="0" smtClean="0"/>
-              <a:t> re</a:t>
-            </a:r>
-            <a:r>
-              <a:rPr lang="sr-Latn-RS" dirty="0" smtClean="0"/>
-              <a:t>č</a:t>
-            </a:r>
-            <a:r>
-              <a:rPr lang="en-US" dirty="0" smtClean="0"/>
-              <a:t> </a:t>
-            </a:r>
-            <a:r>
-              <a:rPr lang="sr-Latn-RS" dirty="0" smtClean="0"/>
-              <a:t>„</a:t>
-            </a:r>
-            <a:r>
-              <a:rPr lang="en-US" dirty="0" smtClean="0"/>
-              <a:t>vi</a:t>
-            </a:r>
-            <a:r>
-              <a:rPr lang="sr-Latn-RS" dirty="0" smtClean="0"/>
-              <a:t>še“</a:t>
-            </a:r>
-            <a:r>
-              <a:rPr lang="en-US" dirty="0" smtClean="0"/>
-              <a:t>.</a:t>
-            </a:r>
-          </a:p>
-          <a:p>
-            <a:pPr marL="603504" lvl="2" indent="0">
-              <a:buNone/>
-            </a:pPr>
-            <a:endParaRPr lang="sr-Latn-RS" dirty="0" smtClean="0"/>
-          </a:p>
-        </p:txBody>
-      </p:sp>
+        </p:nvPicPr>
+        <p:blipFill>
+          <a:blip r:embed="rId2">
+            <a:extLst>
+              <a:ext uri="{28A0092B-C50C-407E-A947-70E740481C1C}">
+                <a14:useLocalDpi xmlns:a14="http://schemas.microsoft.com/office/drawing/2010/main" val="0"/>
+              </a:ext>
+            </a:extLst>
+          </a:blip>
+          <a:srcRect/>
+          <a:stretch>
+            <a:fillRect/>
+          </a:stretch>
+        </p:blipFill>
+        <p:spPr bwMode="auto">
+          <a:xfrm>
+            <a:off x="1981200" y="1752600"/>
+            <a:ext cx="4724400" cy="4035425"/>
+          </a:xfrm>
+          <a:prstGeom prst="rect">
+            <a:avLst/>
+          </a:prstGeom>
+          <a:noFill/>
+          <a:extLst>
+            <a:ext uri="{909E8E84-426E-40DD-AFC4-6F175D3DCCD1}">
+              <a14:hiddenFill xmlns:a14="http://schemas.microsoft.com/office/drawing/2010/main">
+                <a:solidFill>
+                  <a:srgbClr val="FFFFFF"/>
+                </a:solidFill>
+              </a14:hiddenFill>
+            </a:ext>
+          </a:extLst>
+        </p:spPr>
+      </p:pic>
     </p:spTree>
     <p:extLst>
       <p:ext uri="{BB962C8B-B14F-4D97-AF65-F5344CB8AC3E}">
-        <p14:creationId xmlns:p14="http://schemas.microsoft.com/office/powerpoint/2010/main" val="3185614354"/>
+        <p14:creationId xmlns:p14="http://schemas.microsoft.com/office/powerpoint/2010/main" val="1031325976"/>
       </p:ext>
     </p:extLst>
   </p:cSld>
   <p:clrMapOvr>
     <a:masterClrMapping/>
   </p:clrMapOvr>
-  <p:timing>
-    <p:tnLst>
-      <p:par>
-        <p:cTn id="1" dur="indefinite" restart="never" nodeType="tmRoot"/>
-      </p:par>
-    </p:tnLst>
-  </p:timing>
 </p:sld>
 </file>
 
@@ -4673,7 +4751,7 @@
         </p:nvSpPr>
         <p:spPr>
           <a:xfrm>
-            <a:off x="361365" y="457200"/>
+            <a:off x="457200" y="457200"/>
             <a:ext cx="8183880" cy="1051560"/>
           </a:xfrm>
         </p:spPr>
@@ -4709,7 +4787,7 @@
         </p:nvSpPr>
         <p:spPr>
           <a:xfrm>
-            <a:off x="533400" y="1953304"/>
+            <a:off x="381000" y="1752600"/>
             <a:ext cx="8183880" cy="4187952"/>
           </a:xfrm>
         </p:spPr>
@@ -4717,62 +4795,50 @@
           <a:bodyPr/>
           <a:lstStyle/>
           <a:p>
-            <a:pPr marL="0" indent="0" algn="ctr">
-              <a:buNone/>
-            </a:pPr>
+            <a:pPr lvl="1"/>
             <a:r>
               <a:rPr lang="sr-Latn-RS" dirty="0" smtClean="0"/>
-              <a:t>Primer spefikacije</a:t>
-            </a:r>
-            <a:endParaRPr lang="en-US" dirty="0"/>
-          </a:p>
-        </p:txBody>
-      </p:sp>
-      <p:pic>
-        <p:nvPicPr>
-          <p:cNvPr id="1026" name="Picture 2" descr="C:\Users\Bojan\Desktop\p.png"/>
-          <p:cNvPicPr>
-            <a:picLocks noChangeAspect="1" noChangeArrowheads="1"/>
-          </p:cNvPicPr>
-          <p:nvPr/>
-        </p:nvPicPr>
-        <p:blipFill>
-          <a:blip r:embed="rId2">
-            <a:extLst>
-              <a:ext uri="{28A0092B-C50C-407E-A947-70E740481C1C}">
-                <a14:useLocalDpi xmlns:a14="http://schemas.microsoft.com/office/drawing/2010/main" val="0"/>
-              </a:ext>
-            </a:extLst>
-          </a:blip>
-          <a:srcRect/>
-          <a:stretch>
-            <a:fillRect/>
-          </a:stretch>
-        </p:blipFill>
-        <p:spPr bwMode="auto">
-          <a:xfrm>
-            <a:off x="457200" y="2971800"/>
-            <a:ext cx="8229600" cy="2590800"/>
-          </a:xfrm>
-          <a:prstGeom prst="rect">
-            <a:avLst/>
-          </a:prstGeom>
-          <a:noFill/>
-          <a:extLst>
-            <a:ext uri="{909E8E84-426E-40DD-AFC4-6F175D3DCCD1}">
-              <a14:hiddenFill xmlns:a14="http://schemas.microsoft.com/office/drawing/2010/main">
-                <a:solidFill>
-                  <a:srgbClr val="FFFFFF"/>
-                </a:solidFill>
-              </a14:hiddenFill>
-            </a:ext>
-          </a:extLst>
-        </p:spPr>
-      </p:pic>
+              <a:t>U prvom koraku potrebno je n</a:t>
+            </a:r>
+            <a:r>
+              <a:rPr lang="en-US" dirty="0" smtClean="0"/>
+              <a:t>a </a:t>
+            </a:r>
+            <a:r>
+              <a:rPr lang="en-US" dirty="0" err="1" smtClean="0"/>
+              <a:t>osnovu</a:t>
+            </a:r>
+            <a:r>
+              <a:rPr lang="en-US" dirty="0" smtClean="0"/>
+              <a:t> </a:t>
+            </a:r>
+            <a:r>
+              <a:rPr lang="sr-Latn-RS" dirty="0" smtClean="0"/>
+              <a:t>slike sa napisanom specifikacijom </a:t>
+            </a:r>
+            <a:r>
+              <a:rPr lang="en-US" dirty="0" err="1" smtClean="0"/>
+              <a:t>prepoznati</a:t>
+            </a:r>
+            <a:r>
+              <a:rPr lang="en-US" dirty="0" smtClean="0"/>
+              <a:t> </a:t>
+            </a:r>
+            <a:r>
+              <a:rPr lang="sr-Latn-RS" dirty="0" smtClean="0"/>
+              <a:t>tekst(koji je napisan na engleskom jeziku). Slika se prosledi na Tesserakt-u koji odradi taj deo i vrati nam tekstualni format specifikacije. To je ujedno i ulaz u drugi korak.</a:t>
+            </a:r>
+          </a:p>
+          <a:p>
+            <a:pPr lvl="1"/>
+            <a:endParaRPr lang="sr-Latn-RS" dirty="0" smtClean="0"/>
+          </a:p>
+        </p:txBody>
+      </p:sp>
     </p:spTree>
     <p:extLst>
       <p:ext uri="{BB962C8B-B14F-4D97-AF65-F5344CB8AC3E}">
-        <p14:creationId xmlns:p14="http://schemas.microsoft.com/office/powerpoint/2010/main" val="3624914112"/>
+        <p14:creationId xmlns:p14="http://schemas.microsoft.com/office/powerpoint/2010/main" val="3185614354"/>
       </p:ext>
     </p:extLst>
   </p:cSld>
@@ -4818,7 +4884,7 @@
         </p:nvSpPr>
         <p:spPr>
           <a:xfrm>
-            <a:off x="533400" y="533400"/>
+            <a:off x="361365" y="457200"/>
             <a:ext cx="8183880" cy="1051560"/>
           </a:xfrm>
         </p:spPr>
@@ -4854,7 +4920,7 @@
         </p:nvSpPr>
         <p:spPr>
           <a:xfrm>
-            <a:off x="457200" y="1905000"/>
+            <a:off x="533400" y="1953304"/>
             <a:ext cx="8183880" cy="4187952"/>
           </a:xfrm>
         </p:spPr>
@@ -4862,51 +4928,62 @@
           <a:bodyPr/>
           <a:lstStyle/>
           <a:p>
-            <a:pPr lvl="1"/>
-            <a:r>
-              <a:rPr lang="en-US" dirty="0" smtClean="0"/>
-              <a:t>Na </a:t>
-            </a:r>
-            <a:r>
-              <a:rPr lang="en-US" dirty="0" err="1" smtClean="0"/>
-              <a:t>osnovu</a:t>
-            </a:r>
-            <a:r>
-              <a:rPr lang="en-US" dirty="0" smtClean="0"/>
-              <a:t> </a:t>
-            </a:r>
-            <a:r>
-              <a:rPr lang="en-US" dirty="0" err="1" smtClean="0"/>
-              <a:t>prepoznate</a:t>
-            </a:r>
-            <a:r>
-              <a:rPr lang="en-US" dirty="0" smtClean="0"/>
-              <a:t> </a:t>
-            </a:r>
-            <a:r>
-              <a:rPr lang="en-US" dirty="0" err="1" smtClean="0"/>
-              <a:t>specifikacije</a:t>
-            </a:r>
-            <a:r>
-              <a:rPr lang="en-US" dirty="0" smtClean="0"/>
-              <a:t> </a:t>
-            </a:r>
-            <a:r>
-              <a:rPr lang="en-US" dirty="0" err="1" smtClean="0"/>
-              <a:t>vr</a:t>
-            </a:r>
+            <a:pPr marL="0" indent="0" algn="ctr">
+              <a:buNone/>
+            </a:pPr>
             <a:r>
               <a:rPr lang="sr-Latn-RS" dirty="0" smtClean="0"/>
-              <a:t>ši se crtanje ER dijagrama pri čemu je svaki entitet prikazan pravouganikom a veze između entiteta krugom spojenim linijama sa odgovarajućim kardinalitetima. Sam naziv entiteta biće preuzet iz specifikacije.</a:t>
+              <a:t>Primer spefikacije</a:t>
             </a:r>
             <a:endParaRPr lang="en-US" dirty="0"/>
           </a:p>
         </p:txBody>
       </p:sp>
+      <p:pic>
+        <p:nvPicPr>
+          <p:cNvPr id="1026" name="Picture 2" descr="C:\Users\Bojan\Desktop\p.png"/>
+          <p:cNvPicPr>
+            <a:picLocks noChangeAspect="1" noChangeArrowheads="1"/>
+          </p:cNvPicPr>
+          <p:nvPr/>
+        </p:nvPicPr>
+        <p:blipFill>
+          <a:blip r:embed="rId2">
+            <a:extLst>
+              <a:ext uri="{28A0092B-C50C-407E-A947-70E740481C1C}">
+                <a14:useLocalDpi xmlns:a14="http://schemas.microsoft.com/office/drawing/2010/main" val="0"/>
+              </a:ext>
+            </a:extLst>
+          </a:blip>
+          <a:srcRect/>
+          <a:stretch>
+            <a:fillRect/>
+          </a:stretch>
+        </p:blipFill>
+        <p:spPr bwMode="auto">
+          <a:xfrm>
+            <a:off x="457200" y="2971800"/>
+            <a:ext cx="8229600" cy="2590800"/>
+          </a:xfrm>
+          <a:prstGeom prst="rect">
+            <a:avLst/>
+          </a:prstGeom>
+          <a:noFill/>
+          <a:extLst>
+            <a:ext uri="{909E8E84-426E-40DD-AFC4-6F175D3DCCD1}">
+              <a14:hiddenFill xmlns:a14="http://schemas.microsoft.com/office/drawing/2010/main">
+                <a:solidFill>
+                  <a:srgbClr val="FFFFFF"/>
+                </a:solidFill>
+              </a14:hiddenFill>
+            </a:ext>
+          </a:extLst>
+        </p:spPr>
+      </p:pic>
     </p:spTree>
     <p:extLst>
       <p:ext uri="{BB962C8B-B14F-4D97-AF65-F5344CB8AC3E}">
-        <p14:creationId xmlns:p14="http://schemas.microsoft.com/office/powerpoint/2010/main" val="3956661714"/>
+        <p14:creationId xmlns:p14="http://schemas.microsoft.com/office/powerpoint/2010/main" val="3624914112"/>
       </p:ext>
     </p:extLst>
   </p:cSld>
@@ -4942,6 +5019,361 @@
       </p:grpSpPr>
       <p:sp>
         <p:nvSpPr>
+          <p:cNvPr id="3" name="Content Placeholder 2"/>
+          <p:cNvSpPr>
+            <a:spLocks noGrp="1"/>
+          </p:cNvSpPr>
+          <p:nvPr>
+            <p:ph idx="1"/>
+          </p:nvPr>
+        </p:nvSpPr>
+        <p:spPr>
+          <a:xfrm>
+            <a:off x="457200" y="1676400"/>
+            <a:ext cx="8183880" cy="4270248"/>
+          </a:xfrm>
+        </p:spPr>
+        <p:txBody>
+          <a:bodyPr>
+            <a:normAutofit/>
+          </a:bodyPr>
+          <a:lstStyle/>
+          <a:p>
+            <a:pPr lvl="1"/>
+            <a:r>
+              <a:rPr lang="sr-Latn-RS" dirty="0"/>
+              <a:t>U drugom koraku potrebno je iz </a:t>
+            </a:r>
+            <a:r>
+              <a:rPr lang="sr-Latn-RS" dirty="0" smtClean="0"/>
+              <a:t>rečenica prepoznazi </a:t>
+            </a:r>
+            <a:r>
+              <a:rPr lang="en-US" dirty="0" err="1"/>
+              <a:t>sta</a:t>
+            </a:r>
+            <a:r>
+              <a:rPr lang="en-US" dirty="0"/>
+              <a:t> </a:t>
+            </a:r>
+            <a:r>
+              <a:rPr lang="en-US" dirty="0" err="1"/>
+              <a:t>su</a:t>
+            </a:r>
+            <a:r>
+              <a:rPr lang="en-US" dirty="0"/>
+              <a:t> </a:t>
+            </a:r>
+            <a:r>
+              <a:rPr lang="en-US" dirty="0" err="1"/>
+              <a:t>entiteti</a:t>
+            </a:r>
+            <a:r>
+              <a:rPr lang="en-US" dirty="0"/>
+              <a:t>, </a:t>
+            </a:r>
+            <a:r>
+              <a:rPr lang="en-US" dirty="0" err="1"/>
+              <a:t>katdinalitete</a:t>
+            </a:r>
+            <a:r>
+              <a:rPr lang="en-US" dirty="0"/>
+              <a:t> i </a:t>
+            </a:r>
+            <a:r>
+              <a:rPr lang="en-US" dirty="0" err="1"/>
+              <a:t>poveznike</a:t>
+            </a:r>
+            <a:r>
+              <a:rPr lang="en-US" dirty="0" smtClean="0"/>
+              <a:t>.</a:t>
+            </a:r>
+            <a:r>
+              <a:rPr lang="sr-Latn-RS" dirty="0" smtClean="0"/>
+              <a:t> </a:t>
+            </a:r>
+          </a:p>
+          <a:p>
+            <a:pPr lvl="2"/>
+            <a:r>
+              <a:rPr lang="sr-Latn-RS" dirty="0"/>
+              <a:t>Kardinaliteti se navode pomoću brojeva ’0’ , ’1’ i  karaktera ’*’</a:t>
+            </a:r>
+            <a:r>
+              <a:rPr lang="en-US" dirty="0"/>
+              <a:t> </a:t>
+            </a:r>
+            <a:r>
+              <a:rPr lang="en-US" dirty="0" err="1"/>
+              <a:t>koja</a:t>
+            </a:r>
+            <a:r>
+              <a:rPr lang="en-US" dirty="0"/>
+              <a:t> </a:t>
+            </a:r>
+            <a:r>
+              <a:rPr lang="en-US" dirty="0" err="1"/>
+              <a:t>predstavlja</a:t>
+            </a:r>
+            <a:r>
+              <a:rPr lang="en-US" dirty="0"/>
+              <a:t> re</a:t>
+            </a:r>
+            <a:r>
+              <a:rPr lang="sr-Latn-RS" dirty="0"/>
+              <a:t>č</a:t>
+            </a:r>
+            <a:r>
+              <a:rPr lang="en-US" dirty="0"/>
+              <a:t> </a:t>
+            </a:r>
+            <a:r>
+              <a:rPr lang="sr-Latn-RS" dirty="0"/>
+              <a:t>„</a:t>
+            </a:r>
+            <a:r>
+              <a:rPr lang="en-US" dirty="0"/>
+              <a:t>vi</a:t>
+            </a:r>
+            <a:r>
+              <a:rPr lang="sr-Latn-RS" dirty="0"/>
+              <a:t>še“</a:t>
+            </a:r>
+            <a:r>
+              <a:rPr lang="en-US" dirty="0" smtClean="0"/>
+              <a:t>.</a:t>
+            </a:r>
+            <a:endParaRPr lang="sr-Latn-RS" dirty="0" smtClean="0"/>
+          </a:p>
+          <a:p>
+            <a:pPr lvl="1"/>
+            <a:r>
+              <a:rPr lang="sr-Latn-RS" dirty="0"/>
+              <a:t>Ovaj deo odradjuje NLTK(Natural Language Toolkit). Kao izlaz iz </a:t>
+            </a:r>
+            <a:r>
+              <a:rPr lang="sr-Latn-RS" dirty="0" smtClean="0"/>
+              <a:t>NLTK dobija </a:t>
+            </a:r>
+            <a:r>
+              <a:rPr lang="sr-Latn-RS" dirty="0"/>
+              <a:t>se tekst izdeljen na reči, i svakoj reči pridružen je „tag“ koji predstavlja značenje te reči</a:t>
+            </a:r>
+            <a:r>
+              <a:rPr lang="sr-Latn-RS" dirty="0" smtClean="0"/>
+              <a:t>. Izlaz iz ovog koraka zapisuje se u tekstualni file i prosledjuje na korak 3.</a:t>
+            </a:r>
+          </a:p>
+          <a:p>
+            <a:pPr lvl="1"/>
+            <a:endParaRPr lang="sr-Latn-RS" dirty="0"/>
+          </a:p>
+          <a:p>
+            <a:pPr lvl="1"/>
+            <a:endParaRPr lang="sr-Latn-RS" dirty="0" smtClean="0"/>
+          </a:p>
+          <a:p>
+            <a:pPr marL="342900" lvl="1" indent="-342900">
+              <a:buSzPct val="80000"/>
+            </a:pPr>
+            <a:endParaRPr lang="sr-Latn-RS" dirty="0" smtClean="0"/>
+          </a:p>
+          <a:p>
+            <a:pPr marL="0" indent="0">
+              <a:buNone/>
+            </a:pPr>
+            <a:endParaRPr lang="sr-Latn-RS" dirty="0"/>
+          </a:p>
+        </p:txBody>
+      </p:sp>
+      <p:sp>
+        <p:nvSpPr>
+          <p:cNvPr id="4" name="Title 1"/>
+          <p:cNvSpPr>
+            <a:spLocks noGrp="1"/>
+          </p:cNvSpPr>
+          <p:nvPr>
+            <p:ph type="title"/>
+          </p:nvPr>
+        </p:nvSpPr>
+        <p:spPr>
+          <a:xfrm>
+            <a:off x="381000" y="304800"/>
+            <a:ext cx="8183880" cy="1051560"/>
+          </a:xfrm>
+        </p:spPr>
+        <p:txBody>
+          <a:bodyPr/>
+          <a:lstStyle/>
+          <a:p>
+            <a:r>
+              <a:rPr lang="en-US" dirty="0" err="1"/>
+              <a:t>Crtanje</a:t>
+            </a:r>
+            <a:r>
+              <a:rPr lang="en-US" dirty="0"/>
+              <a:t> ER </a:t>
+            </a:r>
+            <a:r>
+              <a:rPr lang="en-US" dirty="0" err="1"/>
+              <a:t>dijagrama</a:t>
+            </a:r>
+            <a:endParaRPr lang="en-US" dirty="0"/>
+          </a:p>
+        </p:txBody>
+      </p:sp>
+    </p:spTree>
+    <p:extLst>
+      <p:ext uri="{BB962C8B-B14F-4D97-AF65-F5344CB8AC3E}">
+        <p14:creationId xmlns:p14="http://schemas.microsoft.com/office/powerpoint/2010/main" val="580703404"/>
+      </p:ext>
+    </p:extLst>
+  </p:cSld>
+  <p:clrMapOvr>
+    <a:masterClrMapping/>
+  </p:clrMapOvr>
+</p:sld>
+</file>
+
+<file path=ppt/slides/slide8.xml><?xml version="1.0" encoding="utf-8"?>
+<p:sld xmlns:a="http://schemas.openxmlformats.org/drawingml/2006/main" xmlns:r="http://schemas.openxmlformats.org/officeDocument/2006/relationships" xmlns:p="http://schemas.openxmlformats.org/presentationml/2006/main">
+  <p:cSld>
+    <p:spTree>
+      <p:nvGrpSpPr>
+        <p:cNvPr id="1" name=""/>
+        <p:cNvGrpSpPr/>
+        <p:nvPr/>
+      </p:nvGrpSpPr>
+      <p:grpSpPr>
+        <a:xfrm>
+          <a:off x="0" y="0"/>
+          <a:ext cx="0" cy="0"/>
+          <a:chOff x="0" y="0"/>
+          <a:chExt cx="0" cy="0"/>
+        </a:xfrm>
+      </p:grpSpPr>
+      <p:sp>
+        <p:nvSpPr>
+          <p:cNvPr id="3" name="Content Placeholder 2"/>
+          <p:cNvSpPr>
+            <a:spLocks noGrp="1"/>
+          </p:cNvSpPr>
+          <p:nvPr>
+            <p:ph idx="1"/>
+          </p:nvPr>
+        </p:nvSpPr>
+        <p:spPr>
+          <a:xfrm>
+            <a:off x="533400" y="1447800"/>
+            <a:ext cx="8183880" cy="4187952"/>
+          </a:xfrm>
+        </p:spPr>
+        <p:txBody>
+          <a:bodyPr>
+            <a:normAutofit/>
+          </a:bodyPr>
+          <a:lstStyle/>
+          <a:p>
+            <a:pPr marL="342900" lvl="1" indent="-342900">
+              <a:buSzPct val="80000"/>
+            </a:pPr>
+            <a:r>
+              <a:rPr lang="sr-Latn-RS" dirty="0"/>
+              <a:t>U </a:t>
+            </a:r>
+            <a:r>
+              <a:rPr lang="sr-Latn-RS" dirty="0" smtClean="0"/>
+              <a:t>trećem koraku parsira se izlaz iz nltk-a i izdvajaju se entiteti, poveznici i kardinaliteti pošto su nam oni potrebni za iscrtavanje šeme.</a:t>
+            </a:r>
+          </a:p>
+          <a:p>
+            <a:pPr marL="342900" lvl="1" indent="-342900">
+              <a:buSzPct val="80000"/>
+            </a:pPr>
+            <a:r>
+              <a:rPr lang="sr-Latn-RS" dirty="0" smtClean="0"/>
+              <a:t>U četvrtom koraku iscrtava se šema na osnovu pikupljenih podataka u prethodna 3 koraka, </a:t>
+            </a:r>
+            <a:r>
+              <a:rPr lang="sr-Latn-RS" dirty="0"/>
+              <a:t>pri čemu je svaki entitet prikazan pravouganikom a veze između entiteta krugom spojenim linijama sa odgovarajućim kardinalitetima</a:t>
+            </a:r>
+            <a:r>
+              <a:rPr lang="sr-Latn-RS" dirty="0" smtClean="0"/>
+              <a:t>.</a:t>
+            </a:r>
+            <a:endParaRPr lang="sr-Latn-RS" dirty="0"/>
+          </a:p>
+        </p:txBody>
+      </p:sp>
+      <p:sp>
+        <p:nvSpPr>
+          <p:cNvPr id="4" name="Title 1"/>
+          <p:cNvSpPr>
+            <a:spLocks noGrp="1"/>
+          </p:cNvSpPr>
+          <p:nvPr>
+            <p:ph type="title"/>
+          </p:nvPr>
+        </p:nvSpPr>
+        <p:spPr>
+          <a:xfrm>
+            <a:off x="381000" y="304800"/>
+            <a:ext cx="8183880" cy="1051560"/>
+          </a:xfrm>
+        </p:spPr>
+        <p:txBody>
+          <a:bodyPr/>
+          <a:lstStyle/>
+          <a:p>
+            <a:r>
+              <a:rPr lang="en-US" dirty="0" err="1"/>
+              <a:t>Crtanje</a:t>
+            </a:r>
+            <a:r>
+              <a:rPr lang="en-US" dirty="0"/>
+              <a:t> ER </a:t>
+            </a:r>
+            <a:r>
+              <a:rPr lang="en-US" dirty="0" err="1"/>
+              <a:t>dijagrama</a:t>
+            </a:r>
+            <a:endParaRPr lang="en-US" dirty="0"/>
+          </a:p>
+        </p:txBody>
+      </p:sp>
+    </p:spTree>
+    <p:extLst>
+      <p:ext uri="{BB962C8B-B14F-4D97-AF65-F5344CB8AC3E}">
+        <p14:creationId xmlns:p14="http://schemas.microsoft.com/office/powerpoint/2010/main" val="2386902028"/>
+      </p:ext>
+    </p:extLst>
+  </p:cSld>
+  <p:clrMapOvr>
+    <a:masterClrMapping/>
+  </p:clrMapOvr>
+</p:sld>
+</file>
+
+<file path=ppt/slides/slide9.xml><?xml version="1.0" encoding="utf-8"?>
+<p:sld xmlns:a="http://schemas.openxmlformats.org/drawingml/2006/main" xmlns:r="http://schemas.openxmlformats.org/officeDocument/2006/relationships" xmlns:p="http://schemas.openxmlformats.org/presentationml/2006/main">
+  <p:cSld>
+    <p:spTree>
+      <p:nvGrpSpPr>
+        <p:cNvPr id="1" name=""/>
+        <p:cNvGrpSpPr/>
+        <p:nvPr/>
+      </p:nvGrpSpPr>
+      <p:grpSpPr>
+        <a:xfrm>
+          <a:off x="0" y="0"/>
+          <a:ext cx="0" cy="0"/>
+          <a:chOff x="0" y="0"/>
+          <a:chExt cx="0" cy="0"/>
+        </a:xfrm>
+      </p:grpSpPr>
+      <p:sp>
+        <p:nvSpPr>
           <p:cNvPr id="2" name="Title 1"/>
           <p:cNvSpPr>
             <a:spLocks noGrp="1"/>
@@ -5034,286 +5466,6 @@
       </p:par>
     </p:tnLst>
   </p:timing>
-</p:sld>
-</file>
-
-<file path=ppt/slides/slide8.xml><?xml version="1.0" encoding="utf-8"?>
-<p:sld xmlns:a="http://schemas.openxmlformats.org/drawingml/2006/main" xmlns:r="http://schemas.openxmlformats.org/officeDocument/2006/relationships" xmlns:p="http://schemas.openxmlformats.org/presentationml/2006/main">
-  <p:cSld>
-    <p:spTree>
-      <p:nvGrpSpPr>
-        <p:cNvPr id="1" name=""/>
-        <p:cNvGrpSpPr/>
-        <p:nvPr/>
-      </p:nvGrpSpPr>
-      <p:grpSpPr>
-        <a:xfrm>
-          <a:off x="0" y="0"/>
-          <a:ext cx="0" cy="0"/>
-          <a:chOff x="0" y="0"/>
-          <a:chExt cx="0" cy="0"/>
-        </a:xfrm>
-      </p:grpSpPr>
-      <p:sp>
-        <p:nvSpPr>
-          <p:cNvPr id="2" name="Title 1"/>
-          <p:cNvSpPr>
-            <a:spLocks noGrp="1"/>
-          </p:cNvSpPr>
-          <p:nvPr>
-            <p:ph type="title"/>
-          </p:nvPr>
-        </p:nvSpPr>
-        <p:spPr>
-          <a:xfrm>
-            <a:off x="381000" y="457200"/>
-            <a:ext cx="8183880" cy="1051560"/>
-          </a:xfrm>
-        </p:spPr>
-        <p:txBody>
-          <a:bodyPr/>
-          <a:lstStyle/>
-          <a:p>
-            <a:r>
-              <a:rPr lang="en-US" dirty="0" err="1"/>
-              <a:t>Crtanje</a:t>
-            </a:r>
-            <a:r>
-              <a:rPr lang="en-US" dirty="0"/>
-              <a:t> ER </a:t>
-            </a:r>
-            <a:r>
-              <a:rPr lang="en-US" dirty="0" err="1"/>
-              <a:t>dijagrama</a:t>
-            </a:r>
-            <a:endParaRPr lang="en-US" dirty="0"/>
-          </a:p>
-        </p:txBody>
-      </p:sp>
-      <p:sp>
-        <p:nvSpPr>
-          <p:cNvPr id="3" name="Content Placeholder 2"/>
-          <p:cNvSpPr>
-            <a:spLocks noGrp="1"/>
-          </p:cNvSpPr>
-          <p:nvPr>
-            <p:ph idx="1"/>
-          </p:nvPr>
-        </p:nvSpPr>
-        <p:spPr>
-          <a:xfrm>
-            <a:off x="457200" y="1905000"/>
-            <a:ext cx="8183880" cy="4187952"/>
-          </a:xfrm>
-        </p:spPr>
-        <p:txBody>
-          <a:bodyPr/>
-          <a:lstStyle/>
-          <a:p>
-            <a:r>
-              <a:rPr lang="sr-Latn-RS" dirty="0" smtClean="0"/>
-              <a:t>Na već </a:t>
-            </a:r>
-            <a:r>
-              <a:rPr lang="en-US" dirty="0" err="1" smtClean="0"/>
-              <a:t>gotovom</a:t>
-            </a:r>
-            <a:r>
-              <a:rPr lang="en-US" dirty="0" smtClean="0"/>
-              <a:t> </a:t>
-            </a:r>
-            <a:r>
-              <a:rPr lang="en-US" dirty="0" err="1" smtClean="0"/>
-              <a:t>prikazu</a:t>
-            </a:r>
-            <a:r>
-              <a:rPr lang="en-US" dirty="0" smtClean="0"/>
-              <a:t> </a:t>
-            </a:r>
-            <a:r>
-              <a:rPr lang="sr-Latn-RS" dirty="0" smtClean="0"/>
-              <a:t>moguće je klikom na vezu dobiti </a:t>
-            </a:r>
-            <a:r>
-              <a:rPr lang="sr-Latn-RS" i="1" dirty="0" smtClean="0"/>
-              <a:t>message box </a:t>
-            </a:r>
-            <a:r>
-              <a:rPr lang="sr-Latn-RS" dirty="0" smtClean="0"/>
-              <a:t>sa ispisanim kardinalitetima i entitetima koji ucestvuju u vezi ili jednostavnim prislanjanjem kursora miša na vezu takodje je moguće videti kardinalitete kao </a:t>
-            </a:r>
-            <a:r>
-              <a:rPr lang="sr-Latn-RS" i="1" dirty="0" smtClean="0"/>
-              <a:t>tooltip</a:t>
-            </a:r>
-            <a:r>
-              <a:rPr lang="sr-Latn-RS" dirty="0" smtClean="0"/>
-              <a:t>. Pored toga, omogućen je </a:t>
-            </a:r>
-            <a:r>
-              <a:rPr lang="sr-Latn-RS" i="1" dirty="0" smtClean="0"/>
-              <a:t>drag&amp;drop</a:t>
-            </a:r>
-            <a:r>
-              <a:rPr lang="sr-Latn-RS" dirty="0" smtClean="0"/>
-              <a:t> </a:t>
-            </a:r>
-            <a:r>
-              <a:rPr lang="en-US" dirty="0" err="1" smtClean="0"/>
-              <a:t>nad</a:t>
-            </a:r>
-            <a:r>
-              <a:rPr lang="en-US" dirty="0" smtClean="0"/>
-              <a:t> </a:t>
-            </a:r>
-            <a:r>
-              <a:rPr lang="sr-Latn-RS" dirty="0" smtClean="0"/>
-              <a:t>entitet</a:t>
-            </a:r>
-            <a:r>
-              <a:rPr lang="en-US" dirty="0" err="1" smtClean="0"/>
-              <a:t>ima</a:t>
-            </a:r>
-            <a:r>
-              <a:rPr lang="en-US" dirty="0" smtClean="0"/>
-              <a:t> </a:t>
-            </a:r>
-            <a:r>
-              <a:rPr lang="sr-Latn-RS" dirty="0" smtClean="0"/>
-              <a:t>i nj</a:t>
-            </a:r>
-            <a:r>
-              <a:rPr lang="en-US" dirty="0" err="1" smtClean="0"/>
-              <a:t>ihovim</a:t>
-            </a:r>
-            <a:r>
-              <a:rPr lang="sr-Latn-RS" dirty="0" smtClean="0"/>
-              <a:t> vez</a:t>
-            </a:r>
-            <a:r>
-              <a:rPr lang="en-US" dirty="0" err="1" smtClean="0"/>
-              <a:t>ama</a:t>
-            </a:r>
-            <a:r>
-              <a:rPr lang="sr-Latn-RS" dirty="0" smtClean="0"/>
-              <a:t> kao i </a:t>
-            </a:r>
-            <a:r>
-              <a:rPr lang="sr-Latn-RS" i="1" dirty="0" smtClean="0"/>
-              <a:t>zoom </a:t>
-            </a:r>
-            <a:r>
-              <a:rPr lang="sr-Latn-RS" dirty="0" smtClean="0"/>
-              <a:t>samog prikaza.</a:t>
-            </a:r>
-            <a:endParaRPr lang="en-US" dirty="0"/>
-          </a:p>
-        </p:txBody>
-      </p:sp>
-    </p:spTree>
-    <p:extLst>
-      <p:ext uri="{BB962C8B-B14F-4D97-AF65-F5344CB8AC3E}">
-        <p14:creationId xmlns:p14="http://schemas.microsoft.com/office/powerpoint/2010/main" val="1534458821"/>
-      </p:ext>
-    </p:extLst>
-  </p:cSld>
-  <p:clrMapOvr>
-    <a:masterClrMapping/>
-  </p:clrMapOvr>
-  <p:timing>
-    <p:tnLst>
-      <p:par>
-        <p:cTn id="1" dur="indefinite" restart="never" nodeType="tmRoot"/>
-      </p:par>
-    </p:tnLst>
-  </p:timing>
-</p:sld>
-</file>
-
-<file path=ppt/slides/slide9.xml><?xml version="1.0" encoding="utf-8"?>
-<p:sld xmlns:a="http://schemas.openxmlformats.org/drawingml/2006/main" xmlns:r="http://schemas.openxmlformats.org/officeDocument/2006/relationships" xmlns:p="http://schemas.openxmlformats.org/presentationml/2006/main">
-  <p:cSld>
-    <p:spTree>
-      <p:nvGrpSpPr>
-        <p:cNvPr id="1" name=""/>
-        <p:cNvGrpSpPr/>
-        <p:nvPr/>
-      </p:nvGrpSpPr>
-      <p:grpSpPr>
-        <a:xfrm>
-          <a:off x="0" y="0"/>
-          <a:ext cx="0" cy="0"/>
-          <a:chOff x="0" y="0"/>
-          <a:chExt cx="0" cy="0"/>
-        </a:xfrm>
-      </p:grpSpPr>
-      <p:sp>
-        <p:nvSpPr>
-          <p:cNvPr id="2" name="Title 1"/>
-          <p:cNvSpPr>
-            <a:spLocks noGrp="1"/>
-          </p:cNvSpPr>
-          <p:nvPr>
-            <p:ph type="title"/>
-          </p:nvPr>
-        </p:nvSpPr>
-        <p:spPr>
-          <a:xfrm>
-            <a:off x="457200" y="457200"/>
-            <a:ext cx="8183880" cy="1051560"/>
-          </a:xfrm>
-        </p:spPr>
-        <p:txBody>
-          <a:bodyPr/>
-          <a:lstStyle/>
-          <a:p>
-            <a:r>
-              <a:rPr lang="sr-Latn-RS" dirty="0" smtClean="0"/>
-              <a:t>  Pitanja</a:t>
-            </a:r>
-            <a:endParaRPr lang="sr-Latn-RS" dirty="0"/>
-          </a:p>
-        </p:txBody>
-      </p:sp>
-      <p:pic>
-        <p:nvPicPr>
-          <p:cNvPr id="4" name="Content Placeholder 3"/>
-          <p:cNvPicPr>
-            <a:picLocks noGrp="1" noChangeAspect="1"/>
-          </p:cNvPicPr>
-          <p:nvPr>
-            <p:ph idx="1"/>
-          </p:nvPr>
-        </p:nvPicPr>
-        <p:blipFill>
-          <a:blip r:embed="rId2">
-            <a:extLst>
-              <a:ext uri="{28A0092B-C50C-407E-A947-70E740481C1C}">
-                <a14:useLocalDpi xmlns:a14="http://schemas.microsoft.com/office/drawing/2010/main" val="0"/>
-              </a:ext>
-            </a:extLst>
-          </a:blip>
-          <a:stretch>
-            <a:fillRect/>
-          </a:stretch>
-        </p:blipFill>
-        <p:spPr>
-          <a:xfrm>
-            <a:off x="3276600" y="1371600"/>
-            <a:ext cx="3886200" cy="4352014"/>
-          </a:xfrm>
-        </p:spPr>
-      </p:pic>
-    </p:spTree>
-    <p:extLst>
-      <p:ext uri="{BB962C8B-B14F-4D97-AF65-F5344CB8AC3E}">
-        <p14:creationId xmlns:p14="http://schemas.microsoft.com/office/powerpoint/2010/main" val="814834629"/>
-      </p:ext>
-    </p:extLst>
-  </p:cSld>
-  <p:clrMapOvr>
-    <a:masterClrMapping/>
-  </p:clrMapOvr>
 </p:sld>
 </file>
 

</xml_diff>